<commit_message>
update bedrock part of presentation
</commit_message>
<xml_diff>
--- a/Minecraft/Learning DevOps Through Minecraft.pptx
+++ b/Minecraft/Learning DevOps Through Minecraft.pptx
@@ -42680,6 +42680,36 @@
           <a:chExt cx="0" cy="0"/>
         </a:xfrm>
       </p:grpSpPr>
+      <p:pic>
+        <p:nvPicPr>
+          <p:cNvPr id="4" name="Picture 3">
+            <a:extLst>
+              <a:ext uri="{FF2B5EF4-FFF2-40B4-BE49-F238E27FC236}">
+                <a16:creationId xmlns:a16="http://schemas.microsoft.com/office/drawing/2014/main" id="{AF335FAC-B4FC-47BD-5E55-DAF32E4B2297}"/>
+              </a:ext>
+            </a:extLst>
+          </p:cNvPr>
+          <p:cNvPicPr>
+            <a:picLocks noChangeAspect="1"/>
+          </p:cNvPicPr>
+          <p:nvPr/>
+        </p:nvPicPr>
+        <p:blipFill>
+          <a:blip r:embed="rId3"/>
+          <a:stretch>
+            <a:fillRect/>
+          </a:stretch>
+        </p:blipFill>
+        <p:spPr>
+          <a:xfrm>
+            <a:off x="0" y="384299"/>
+            <a:ext cx="12089980" cy="6038447"/>
+          </a:xfrm>
+          <a:prstGeom prst="rect">
+            <a:avLst/>
+          </a:prstGeom>
+        </p:spPr>
+      </p:pic>
       <p:sp>
         <p:nvSpPr>
           <p:cNvPr id="2" name="Title 1">
@@ -42708,36 +42738,6 @@
           </a:p>
         </p:txBody>
       </p:sp>
-      <p:pic>
-        <p:nvPicPr>
-          <p:cNvPr id="5" name="Picture 4">
-            <a:extLst>
-              <a:ext uri="{FF2B5EF4-FFF2-40B4-BE49-F238E27FC236}">
-                <a16:creationId xmlns:a16="http://schemas.microsoft.com/office/drawing/2014/main" id="{5473478E-3397-7087-B654-92F45CE088E7}"/>
-              </a:ext>
-            </a:extLst>
-          </p:cNvPr>
-          <p:cNvPicPr>
-            <a:picLocks noChangeAspect="1"/>
-          </p:cNvPicPr>
-          <p:nvPr/>
-        </p:nvPicPr>
-        <p:blipFill>
-          <a:blip r:embed="rId3"/>
-          <a:stretch>
-            <a:fillRect/>
-          </a:stretch>
-        </p:blipFill>
-        <p:spPr>
-          <a:xfrm>
-            <a:off x="674335" y="1302539"/>
-            <a:ext cx="9685859" cy="5555461"/>
-          </a:xfrm>
-          <a:prstGeom prst="rect">
-            <a:avLst/>
-          </a:prstGeom>
-        </p:spPr>
-      </p:pic>
       <p:sp>
         <p:nvSpPr>
           <p:cNvPr id="7" name="TextBox 6">
@@ -42753,7 +42753,7 @@
         <p:spPr>
           <a:xfrm>
             <a:off x="4540170" y="4436015"/>
-            <a:ext cx="5726574" cy="1815882"/>
+            <a:ext cx="5726574" cy="1323439"/>
           </a:xfrm>
           <a:prstGeom prst="rect">
             <a:avLst/>
@@ -42804,7 +42804,7 @@
                 <a:effectLst/>
                 <a:latin typeface="CaskaydiaCove NF" panose="020B0509020204030204" pitchFamily="49" charset="0"/>
               </a:rPr>
-              <a:t>/537.36 (KHTML, like Gecko) Chrome/129.0.0.0 Safari/537.36\" \"https://www.minecraft.net/bedrockdedicatedserver/bin-linux/bedrock-server-1.21.31.04.zip\" &amp;&amp;</a:t>
+              <a:t>/537.36 (KHTML, like Gecko) Chrome/129.0.0.0 Safari/537.36\" \"https://www.minecraft.net/bedrockdedicatedserver/bin-linux/bedrock-server-1.21.50.10.zip\" &amp;&amp;</a:t>
             </a:r>
             <a:endParaRPr lang="en-US" sz="1600" b="0" dirty="0">
               <a:solidFill>
@@ -46783,14 +46783,21 @@
             <p:ph type="title"/>
           </p:nvPr>
         </p:nvSpPr>
-        <p:spPr/>
+        <p:spPr>
+          <a:xfrm>
+            <a:off x="565150" y="770890"/>
+            <a:ext cx="8088732" cy="1268984"/>
+          </a:xfrm>
+        </p:spPr>
         <p:txBody>
-          <a:bodyPr/>
+          <a:bodyPr>
+            <a:normAutofit fontScale="90000"/>
+          </a:bodyPr>
           <a:lstStyle/>
           <a:p>
             <a:r>
               <a:rPr lang="en-US" dirty="0"/>
-              <a:t>Virtual Machines (VMs)</a:t>
+              <a:t>What are Virtual Machines (VMs)?</a:t>
             </a:r>
           </a:p>
         </p:txBody>

</xml_diff>